<commit_message>
+ correcion ej9 clase17
</commit_message>
<xml_diff>
--- a/07_programacion_matematica/ejercicios/io2021_clase17_ejercicio9_simplex_resuelto.pptx
+++ b/07_programacion_matematica/ejercicios/io2021_clase17_ejercicio9_simplex_resuelto.pptx
@@ -1298,7 +1298,7 @@
   <p:cSld>
     <p:spTree>
       <p:nvGrpSpPr>
-        <p:cNvPr id="72" name="Shape 72"/>
+        <p:cNvPr id="76" name="Shape 76"/>
         <p:cNvGrpSpPr/>
         <p:nvPr/>
       </p:nvGrpSpPr>
@@ -1312,7 +1312,7 @@
       </p:grpSpPr>
       <p:sp>
         <p:nvSpPr>
-          <p:cNvPr id="73" name="Google Shape;73;g90da174482_0_13:notes"/>
+          <p:cNvPr id="77" name="Google Shape;77;g90da174482_0_13:notes"/>
           <p:cNvSpPr/>
           <p:nvPr>
             <p:ph idx="2" type="sldImg"/>
@@ -1357,7 +1357,7 @@
       </p:sp>
       <p:sp>
         <p:nvSpPr>
-          <p:cNvPr id="74" name="Google Shape;74;g90da174482_0_13:notes"/>
+          <p:cNvPr id="78" name="Google Shape;78;g90da174482_0_13:notes"/>
           <p:cNvSpPr txBox="1"/>
           <p:nvPr>
             <p:ph idx="1" type="body"/>
@@ -1416,7 +1416,7 @@
   <p:cSld>
     <p:spTree>
       <p:nvGrpSpPr>
-        <p:cNvPr id="79" name="Shape 79"/>
+        <p:cNvPr id="83" name="Shape 83"/>
         <p:cNvGrpSpPr/>
         <p:nvPr/>
       </p:nvGrpSpPr>
@@ -1430,7 +1430,7 @@
       </p:grpSpPr>
       <p:sp>
         <p:nvSpPr>
-          <p:cNvPr id="80" name="Google Shape;80;g90da174482_0_44:notes"/>
+          <p:cNvPr id="84" name="Google Shape;84;g90da174482_0_44:notes"/>
           <p:cNvSpPr/>
           <p:nvPr>
             <p:ph idx="2" type="sldImg"/>
@@ -1475,7 +1475,7 @@
       </p:sp>
       <p:sp>
         <p:nvSpPr>
-          <p:cNvPr id="81" name="Google Shape;81;g90da174482_0_44:notes"/>
+          <p:cNvPr id="85" name="Google Shape;85;g90da174482_0_44:notes"/>
           <p:cNvSpPr txBox="1"/>
           <p:nvPr>
             <p:ph idx="1" type="body"/>
@@ -1534,7 +1534,7 @@
   <p:cSld>
     <p:spTree>
       <p:nvGrpSpPr>
-        <p:cNvPr id="91" name="Shape 91"/>
+        <p:cNvPr id="95" name="Shape 95"/>
         <p:cNvGrpSpPr/>
         <p:nvPr/>
       </p:nvGrpSpPr>
@@ -1548,7 +1548,7 @@
       </p:grpSpPr>
       <p:sp>
         <p:nvSpPr>
-          <p:cNvPr id="92" name="Google Shape;92;g90da174482_0_56:notes"/>
+          <p:cNvPr id="96" name="Google Shape;96;g90da174482_0_56:notes"/>
           <p:cNvSpPr/>
           <p:nvPr>
             <p:ph idx="2" type="sldImg"/>
@@ -1593,7 +1593,7 @@
       </p:sp>
       <p:sp>
         <p:nvSpPr>
-          <p:cNvPr id="93" name="Google Shape;93;g90da174482_0_56:notes"/>
+          <p:cNvPr id="97" name="Google Shape;97;g90da174482_0_56:notes"/>
           <p:cNvSpPr txBox="1"/>
           <p:nvPr>
             <p:ph idx="1" type="body"/>
@@ -1652,7 +1652,7 @@
   <p:cSld>
     <p:spTree>
       <p:nvGrpSpPr>
-        <p:cNvPr id="98" name="Shape 98"/>
+        <p:cNvPr id="102" name="Shape 102"/>
         <p:cNvGrpSpPr/>
         <p:nvPr/>
       </p:nvGrpSpPr>
@@ -1666,7 +1666,7 @@
       </p:grpSpPr>
       <p:sp>
         <p:nvSpPr>
-          <p:cNvPr id="99" name="Google Shape;99;g90da174482_0_24:notes"/>
+          <p:cNvPr id="103" name="Google Shape;103;g90da174482_0_24:notes"/>
           <p:cNvSpPr/>
           <p:nvPr>
             <p:ph idx="2" type="sldImg"/>
@@ -1711,7 +1711,7 @@
       </p:sp>
       <p:sp>
         <p:nvSpPr>
-          <p:cNvPr id="100" name="Google Shape;100;g90da174482_0_24:notes"/>
+          <p:cNvPr id="104" name="Google Shape;104;g90da174482_0_24:notes"/>
           <p:cNvSpPr txBox="1"/>
           <p:nvPr>
             <p:ph idx="1" type="body"/>
@@ -8331,34 +8331,6 @@
         </p:blipFill>
         <p:spPr>
           <a:xfrm>
-            <a:off x="2362200" y="2105400"/>
-            <a:ext cx="4506450" cy="1039050"/>
-          </a:xfrm>
-          <a:prstGeom prst="rect">
-            <a:avLst/>
-          </a:prstGeom>
-          <a:noFill/>
-          <a:ln>
-            <a:noFill/>
-          </a:ln>
-        </p:spPr>
-      </p:pic>
-      <p:pic>
-        <p:nvPicPr>
-          <p:cNvPr id="70" name="Google Shape;70;p11"/>
-          <p:cNvPicPr preferRelativeResize="0"/>
-          <p:nvPr/>
-        </p:nvPicPr>
-        <p:blipFill>
-          <a:blip r:embed="rId4">
-            <a:alphaModFix/>
-          </a:blip>
-          <a:stretch>
-            <a:fillRect/>
-          </a:stretch>
-        </p:blipFill>
-        <p:spPr>
-          <a:xfrm>
             <a:off x="3429000" y="3629400"/>
             <a:ext cx="2436900" cy="956900"/>
           </a:xfrm>
@@ -8373,7 +8345,7 @@
       </p:pic>
       <p:sp>
         <p:nvSpPr>
-          <p:cNvPr id="71" name="Google Shape;71;p11"/>
+          <p:cNvPr id="70" name="Google Shape;70;p11"/>
           <p:cNvSpPr txBox="1"/>
           <p:nvPr/>
         </p:nvSpPr>
@@ -8413,6 +8385,199 @@
           </a:p>
         </p:txBody>
       </p:sp>
+      <p:grpSp>
+        <p:nvGrpSpPr>
+          <p:cNvPr id="71" name="Google Shape;71;p11"/>
+          <p:cNvGrpSpPr/>
+          <p:nvPr/>
+        </p:nvGrpSpPr>
+        <p:grpSpPr>
+          <a:xfrm>
+            <a:off x="2362200" y="2105400"/>
+            <a:ext cx="4506450" cy="1039050"/>
+            <a:chOff x="2362200" y="2105400"/>
+            <a:chExt cx="4506450" cy="1039050"/>
+          </a:xfrm>
+        </p:grpSpPr>
+        <p:pic>
+          <p:nvPicPr>
+            <p:cNvPr id="72" name="Google Shape;72;p11"/>
+            <p:cNvPicPr preferRelativeResize="0"/>
+            <p:nvPr/>
+          </p:nvPicPr>
+          <p:blipFill>
+            <a:blip r:embed="rId4">
+              <a:alphaModFix/>
+            </a:blip>
+            <a:stretch>
+              <a:fillRect/>
+            </a:stretch>
+          </p:blipFill>
+          <p:spPr>
+            <a:xfrm>
+              <a:off x="2362200" y="2105400"/>
+              <a:ext cx="4506450" cy="1039050"/>
+            </a:xfrm>
+            <a:prstGeom prst="rect">
+              <a:avLst/>
+            </a:prstGeom>
+            <a:noFill/>
+            <a:ln>
+              <a:noFill/>
+            </a:ln>
+          </p:spPr>
+        </p:pic>
+        <p:sp>
+          <p:nvSpPr>
+            <p:cNvPr id="73" name="Google Shape;73;p11"/>
+            <p:cNvSpPr/>
+            <p:nvPr/>
+          </p:nvSpPr>
+          <p:spPr>
+            <a:xfrm>
+              <a:off x="5570775" y="2845850"/>
+              <a:ext cx="193500" cy="249900"/>
+            </a:xfrm>
+            <a:prstGeom prst="rect">
+              <a:avLst/>
+            </a:prstGeom>
+            <a:solidFill>
+              <a:srgbClr val="FFFFFF"/>
+            </a:solidFill>
+            <a:ln cap="flat" cmpd="sng" w="9525">
+              <a:solidFill>
+                <a:srgbClr val="FFFFFF"/>
+              </a:solidFill>
+              <a:prstDash val="solid"/>
+              <a:round/>
+              <a:headEnd len="sm" w="sm" type="none"/>
+              <a:tailEnd len="sm" w="sm" type="none"/>
+            </a:ln>
+          </p:spPr>
+          <p:txBody>
+            <a:bodyPr anchorCtr="0" anchor="ctr" bIns="91425" lIns="91425" spcFirstLastPara="1" rIns="91425" wrap="square" tIns="91425">
+              <a:noAutofit/>
+            </a:bodyPr>
+            <a:lstStyle/>
+            <a:p>
+              <a:pPr indent="0" lvl="0" marL="0" rtl="0" algn="l">
+                <a:spcBef>
+                  <a:spcPts val="0"/>
+                </a:spcBef>
+                <a:spcAft>
+                  <a:spcPts val="0"/>
+                </a:spcAft>
+                <a:buNone/>
+              </a:pPr>
+              <a:r>
+                <a:rPr lang="en"/>
+                <a:t>=</a:t>
+              </a:r>
+              <a:endParaRPr/>
+            </a:p>
+          </p:txBody>
+        </p:sp>
+        <p:sp>
+          <p:nvSpPr>
+            <p:cNvPr id="74" name="Google Shape;74;p11"/>
+            <p:cNvSpPr/>
+            <p:nvPr/>
+          </p:nvSpPr>
+          <p:spPr>
+            <a:xfrm>
+              <a:off x="6104175" y="2541050"/>
+              <a:ext cx="264600" cy="249900"/>
+            </a:xfrm>
+            <a:prstGeom prst="rect">
+              <a:avLst/>
+            </a:prstGeom>
+            <a:solidFill>
+              <a:srgbClr val="FFFFFF"/>
+            </a:solidFill>
+            <a:ln cap="flat" cmpd="sng" w="9525">
+              <a:solidFill>
+                <a:srgbClr val="FFFFFF"/>
+              </a:solidFill>
+              <a:prstDash val="solid"/>
+              <a:round/>
+              <a:headEnd len="sm" w="sm" type="none"/>
+              <a:tailEnd len="sm" w="sm" type="none"/>
+            </a:ln>
+          </p:spPr>
+          <p:txBody>
+            <a:bodyPr anchorCtr="0" anchor="ctr" bIns="91425" lIns="91425" spcFirstLastPara="1" rIns="91425" wrap="square" tIns="91425">
+              <a:noAutofit/>
+            </a:bodyPr>
+            <a:lstStyle/>
+            <a:p>
+              <a:pPr indent="0" lvl="0" marL="0" rtl="0" algn="ctr">
+                <a:spcBef>
+                  <a:spcPts val="0"/>
+                </a:spcBef>
+                <a:spcAft>
+                  <a:spcPts val="0"/>
+                </a:spcAft>
+                <a:buNone/>
+              </a:pPr>
+              <a:r>
+                <a:rPr lang="en"/>
+                <a:t>=</a:t>
+              </a:r>
+              <a:endParaRPr/>
+            </a:p>
+          </p:txBody>
+        </p:sp>
+        <p:sp>
+          <p:nvSpPr>
+            <p:cNvPr id="75" name="Google Shape;75;p11"/>
+            <p:cNvSpPr/>
+            <p:nvPr/>
+          </p:nvSpPr>
+          <p:spPr>
+            <a:xfrm>
+              <a:off x="5805100" y="2221438"/>
+              <a:ext cx="264600" cy="249900"/>
+            </a:xfrm>
+            <a:prstGeom prst="rect">
+              <a:avLst/>
+            </a:prstGeom>
+            <a:solidFill>
+              <a:srgbClr val="FFFFFF"/>
+            </a:solidFill>
+            <a:ln cap="flat" cmpd="sng" w="9525">
+              <a:solidFill>
+                <a:srgbClr val="FFFFFF"/>
+              </a:solidFill>
+              <a:prstDash val="solid"/>
+              <a:round/>
+              <a:headEnd len="sm" w="sm" type="none"/>
+              <a:tailEnd len="sm" w="sm" type="none"/>
+            </a:ln>
+          </p:spPr>
+          <p:txBody>
+            <a:bodyPr anchorCtr="0" anchor="ctr" bIns="91425" lIns="91425" spcFirstLastPara="1" rIns="91425" wrap="square" tIns="91425">
+              <a:noAutofit/>
+            </a:bodyPr>
+            <a:lstStyle/>
+            <a:p>
+              <a:pPr indent="0" lvl="0" marL="0" rtl="0" algn="ctr">
+                <a:spcBef>
+                  <a:spcPts val="0"/>
+                </a:spcBef>
+                <a:spcAft>
+                  <a:spcPts val="0"/>
+                </a:spcAft>
+                <a:buNone/>
+              </a:pPr>
+              <a:r>
+                <a:rPr lang="en"/>
+                <a:t>=</a:t>
+              </a:r>
+              <a:endParaRPr/>
+            </a:p>
+          </p:txBody>
+        </p:sp>
+      </p:grpSp>
     </p:spTree>
   </p:cSld>
   <p:clrMapOvr>
@@ -8429,7 +8594,7 @@
   <p:cSld>
     <p:spTree>
       <p:nvGrpSpPr>
-        <p:cNvPr id="75" name="Shape 75"/>
+        <p:cNvPr id="79" name="Shape 79"/>
         <p:cNvGrpSpPr/>
         <p:nvPr/>
       </p:nvGrpSpPr>
@@ -8443,7 +8608,7 @@
       </p:grpSpPr>
       <p:sp>
         <p:nvSpPr>
-          <p:cNvPr id="76" name="Google Shape;76;p12"/>
+          <p:cNvPr id="80" name="Google Shape;80;p12"/>
           <p:cNvSpPr txBox="1"/>
           <p:nvPr>
             <p:ph type="title"/>
@@ -8508,7 +8673,7 @@
       </p:sp>
       <p:sp>
         <p:nvSpPr>
-          <p:cNvPr id="77" name="Google Shape;77;p12"/>
+          <p:cNvPr id="81" name="Google Shape;81;p12"/>
           <p:cNvSpPr txBox="1"/>
           <p:nvPr/>
         </p:nvSpPr>
@@ -8565,7 +8730,7 @@
       </p:sp>
       <p:graphicFrame>
         <p:nvGraphicFramePr>
-          <p:cNvPr id="78" name="Google Shape;78;p12"/>
+          <p:cNvPr id="82" name="Google Shape;82;p12"/>
           <p:cNvGraphicFramePr/>
           <p:nvPr/>
         </p:nvGraphicFramePr>
@@ -8578,7 +8743,7 @@
             <a:tbl>
               <a:tblPr>
                 <a:noFill/>
-                <a:tableStyleId>{F5A980DE-0151-4C83-A769-46180FA05B98}</a:tableStyleId>
+                <a:tableStyleId>{1349FA9F-8294-40C9-B72F-6E4B6E38948B}</a:tableStyleId>
               </a:tblPr>
               <a:tblGrid>
                 <a:gridCol w="1307925"/>
@@ -8908,9 +9073,18 @@
                           <a:cs typeface="Helvetica Neue"/>
                           <a:sym typeface="Helvetica Neue"/>
                         </a:rPr>
-                        <a:t>Bi</a:t>
+                        <a:t>B</a:t>
                       </a:r>
-                      <a:endParaRPr b="1" sz="1500">
+                      <a:r>
+                        <a:rPr b="1" lang="en" sz="1200">
+                          <a:latin typeface="Helvetica Neue"/>
+                          <a:ea typeface="Helvetica Neue"/>
+                          <a:cs typeface="Helvetica Neue"/>
+                          <a:sym typeface="Helvetica Neue"/>
+                        </a:rPr>
+                        <a:t>k</a:t>
+                      </a:r>
+                      <a:endParaRPr b="1" sz="1200">
                         <a:latin typeface="Helvetica Neue"/>
                         <a:ea typeface="Helvetica Neue"/>
                         <a:cs typeface="Helvetica Neue"/>
@@ -10266,7 +10440,7 @@
   <p:cSld>
     <p:spTree>
       <p:nvGrpSpPr>
-        <p:cNvPr id="82" name="Shape 82"/>
+        <p:cNvPr id="86" name="Shape 86"/>
         <p:cNvGrpSpPr/>
         <p:nvPr/>
       </p:nvGrpSpPr>
@@ -10280,7 +10454,7 @@
       </p:grpSpPr>
       <p:sp>
         <p:nvSpPr>
-          <p:cNvPr id="83" name="Google Shape;83;p13"/>
+          <p:cNvPr id="87" name="Google Shape;87;p13"/>
           <p:cNvSpPr txBox="1"/>
           <p:nvPr>
             <p:ph type="title"/>
@@ -10345,7 +10519,7 @@
       </p:sp>
       <p:sp>
         <p:nvSpPr>
-          <p:cNvPr id="84" name="Google Shape;84;p13"/>
+          <p:cNvPr id="88" name="Google Shape;88;p13"/>
           <p:cNvSpPr txBox="1"/>
           <p:nvPr/>
         </p:nvSpPr>
@@ -10402,7 +10576,7 @@
       </p:sp>
       <p:graphicFrame>
         <p:nvGraphicFramePr>
-          <p:cNvPr id="85" name="Google Shape;85;p13"/>
+          <p:cNvPr id="89" name="Google Shape;89;p13"/>
           <p:cNvGraphicFramePr/>
           <p:nvPr/>
         </p:nvGraphicFramePr>
@@ -10415,7 +10589,7 @@
             <a:tbl>
               <a:tblPr>
                 <a:noFill/>
-                <a:tableStyleId>{F5A980DE-0151-4C83-A769-46180FA05B98}</a:tableStyleId>
+                <a:tableStyleId>{1349FA9F-8294-40C9-B72F-6E4B6E38948B}</a:tableStyleId>
               </a:tblPr>
               <a:tblGrid>
                 <a:gridCol w="1307925"/>
@@ -10745,7 +10919,19 @@
                           <a:cs typeface="Helvetica Neue"/>
                           <a:sym typeface="Helvetica Neue"/>
                         </a:rPr>
-                        <a:t>Bi</a:t>
+                        <a:t>B</a:t>
+                      </a:r>
+                      <a:r>
+                        <a:rPr b="1" lang="en" sz="1200">
+                          <a:solidFill>
+                            <a:schemeClr val="dk1"/>
+                          </a:solidFill>
+                          <a:latin typeface="Helvetica Neue"/>
+                          <a:ea typeface="Helvetica Neue"/>
+                          <a:cs typeface="Helvetica Neue"/>
+                          <a:sym typeface="Helvetica Neue"/>
+                        </a:rPr>
+                        <a:t>k</a:t>
                       </a:r>
                       <a:endParaRPr b="1" sz="1500">
                         <a:latin typeface="Helvetica Neue"/>
@@ -12089,7 +12275,7 @@
       </p:graphicFrame>
       <p:sp>
         <p:nvSpPr>
-          <p:cNvPr id="86" name="Google Shape;86;p13"/>
+          <p:cNvPr id="90" name="Google Shape;90;p13"/>
           <p:cNvSpPr/>
           <p:nvPr/>
         </p:nvSpPr>
@@ -12138,7 +12324,7 @@
       </p:sp>
       <p:sp>
         <p:nvSpPr>
-          <p:cNvPr id="87" name="Google Shape;87;p13"/>
+          <p:cNvPr id="91" name="Google Shape;91;p13"/>
           <p:cNvSpPr/>
           <p:nvPr/>
         </p:nvSpPr>
@@ -12187,7 +12373,7 @@
       </p:sp>
       <p:pic>
         <p:nvPicPr>
-          <p:cNvPr id="88" name="Google Shape;88;p13"/>
+          <p:cNvPr id="92" name="Google Shape;92;p13"/>
           <p:cNvPicPr preferRelativeResize="0"/>
           <p:nvPr/>
         </p:nvPicPr>
@@ -12215,7 +12401,7 @@
       </p:pic>
       <p:sp>
         <p:nvSpPr>
-          <p:cNvPr id="89" name="Google Shape;89;p13"/>
+          <p:cNvPr id="93" name="Google Shape;93;p13"/>
           <p:cNvSpPr/>
           <p:nvPr/>
         </p:nvSpPr>
@@ -12257,7 +12443,7 @@
       </p:sp>
       <p:sp>
         <p:nvSpPr>
-          <p:cNvPr id="90" name="Google Shape;90;p13"/>
+          <p:cNvPr id="94" name="Google Shape;94;p13"/>
           <p:cNvSpPr txBox="1"/>
           <p:nvPr/>
         </p:nvSpPr>
@@ -12321,7 +12507,7 @@
   <p:cSld>
     <p:spTree>
       <p:nvGrpSpPr>
-        <p:cNvPr id="94" name="Shape 94"/>
+        <p:cNvPr id="98" name="Shape 98"/>
         <p:cNvGrpSpPr/>
         <p:nvPr/>
       </p:nvGrpSpPr>
@@ -12335,7 +12521,7 @@
       </p:grpSpPr>
       <p:sp>
         <p:nvSpPr>
-          <p:cNvPr id="95" name="Google Shape;95;p14"/>
+          <p:cNvPr id="99" name="Google Shape;99;p14"/>
           <p:cNvSpPr txBox="1"/>
           <p:nvPr>
             <p:ph type="title"/>
@@ -12400,7 +12586,7 @@
       </p:sp>
       <p:sp>
         <p:nvSpPr>
-          <p:cNvPr id="96" name="Google Shape;96;p14"/>
+          <p:cNvPr id="100" name="Google Shape;100;p14"/>
           <p:cNvSpPr txBox="1"/>
           <p:nvPr/>
         </p:nvSpPr>
@@ -12457,7 +12643,7 @@
       </p:sp>
       <p:graphicFrame>
         <p:nvGraphicFramePr>
-          <p:cNvPr id="97" name="Google Shape;97;p14"/>
+          <p:cNvPr id="101" name="Google Shape;101;p14"/>
           <p:cNvGraphicFramePr/>
           <p:nvPr/>
         </p:nvGraphicFramePr>
@@ -12470,7 +12656,7 @@
             <a:tbl>
               <a:tblPr>
                 <a:noFill/>
-                <a:tableStyleId>{F5A980DE-0151-4C83-A769-46180FA05B98}</a:tableStyleId>
+                <a:tableStyleId>{1349FA9F-8294-40C9-B72F-6E4B6E38948B}</a:tableStyleId>
               </a:tblPr>
               <a:tblGrid>
                 <a:gridCol w="1307925"/>
@@ -12800,7 +12986,19 @@
                           <a:cs typeface="Helvetica Neue"/>
                           <a:sym typeface="Helvetica Neue"/>
                         </a:rPr>
-                        <a:t>Bi</a:t>
+                        <a:t>B</a:t>
+                      </a:r>
+                      <a:r>
+                        <a:rPr b="1" lang="en" sz="1200">
+                          <a:solidFill>
+                            <a:schemeClr val="dk1"/>
+                          </a:solidFill>
+                          <a:latin typeface="Helvetica Neue"/>
+                          <a:ea typeface="Helvetica Neue"/>
+                          <a:cs typeface="Helvetica Neue"/>
+                          <a:sym typeface="Helvetica Neue"/>
+                        </a:rPr>
+                        <a:t>k</a:t>
                       </a:r>
                       <a:endParaRPr b="1" sz="1500">
                         <a:latin typeface="Helvetica Neue"/>
@@ -14185,7 +14383,7 @@
   <p:cSld>
     <p:spTree>
       <p:nvGrpSpPr>
-        <p:cNvPr id="101" name="Shape 101"/>
+        <p:cNvPr id="105" name="Shape 105"/>
         <p:cNvGrpSpPr/>
         <p:nvPr/>
       </p:nvGrpSpPr>
@@ -14199,7 +14397,7 @@
       </p:grpSpPr>
       <p:sp>
         <p:nvSpPr>
-          <p:cNvPr id="102" name="Google Shape;102;p15"/>
+          <p:cNvPr id="106" name="Google Shape;106;p15"/>
           <p:cNvSpPr txBox="1"/>
           <p:nvPr>
             <p:ph type="title"/>
@@ -14264,7 +14462,7 @@
       </p:sp>
       <p:sp>
         <p:nvSpPr>
-          <p:cNvPr id="103" name="Google Shape;103;p15"/>
+          <p:cNvPr id="107" name="Google Shape;107;p15"/>
           <p:cNvSpPr txBox="1"/>
           <p:nvPr/>
         </p:nvSpPr>
@@ -14321,7 +14519,7 @@
       </p:sp>
       <p:sp>
         <p:nvSpPr>
-          <p:cNvPr id="104" name="Google Shape;104;p15"/>
+          <p:cNvPr id="108" name="Google Shape;108;p15"/>
           <p:cNvSpPr txBox="1"/>
           <p:nvPr/>
         </p:nvSpPr>
@@ -14375,7 +14573,7 @@
       </p:sp>
       <p:pic>
         <p:nvPicPr>
-          <p:cNvPr id="105" name="Google Shape;105;p15"/>
+          <p:cNvPr id="109" name="Google Shape;109;p15"/>
           <p:cNvPicPr preferRelativeResize="0"/>
           <p:nvPr/>
         </p:nvPicPr>

</xml_diff>